<commit_message>
update readme and pdf
</commit_message>
<xml_diff>
--- a/Modeling and Prediction.pptx
+++ b/Modeling and Prediction.pptx
@@ -19,7 +19,6 @@
     <p:sldId id="264" r:id="rId13"/>
     <p:sldId id="270" r:id="rId14"/>
     <p:sldId id="271" r:id="rId15"/>
-    <p:sldId id="265" r:id="rId16"/>
   </p:sldIdLst>
   <p:sldSz cx="12192000" cy="6858000"/>
   <p:notesSz cx="6858000" cy="9144000"/>
@@ -118,6 +117,11 @@
       </a:defRPr>
     </a:lvl9pPr>
   </p:defaultTextStyle>
+  <p:extLst>
+    <p:ext uri="{EFAFB233-063F-42B5-8137-9DF3F51BA10A}">
+      <p15:sldGuideLst xmlns:p15="http://schemas.microsoft.com/office/powerpoint/2012/main"/>
+    </p:ext>
+  </p:extLst>
 </p:presentation>
 </file>
 
@@ -268,7 +272,7 @@
           <a:p>
             <a:fld id="{0065C04F-179E-4C52-8CB9-5605EB56CFE5}" type="datetimeFigureOut">
               <a:rPr lang="en-US" smtClean="0"/>
-              <a:t>3/24/2020</a:t>
+              <a:t>3/31/2020</a:t>
             </a:fld>
             <a:endParaRPr lang="en-US"/>
           </a:p>
@@ -466,7 +470,7 @@
           <a:p>
             <a:fld id="{0065C04F-179E-4C52-8CB9-5605EB56CFE5}" type="datetimeFigureOut">
               <a:rPr lang="en-US" smtClean="0"/>
-              <a:t>3/24/2020</a:t>
+              <a:t>3/31/2020</a:t>
             </a:fld>
             <a:endParaRPr lang="en-US"/>
           </a:p>
@@ -674,7 +678,7 @@
           <a:p>
             <a:fld id="{0065C04F-179E-4C52-8CB9-5605EB56CFE5}" type="datetimeFigureOut">
               <a:rPr lang="en-US" smtClean="0"/>
-              <a:t>3/24/2020</a:t>
+              <a:t>3/31/2020</a:t>
             </a:fld>
             <a:endParaRPr lang="en-US"/>
           </a:p>
@@ -872,7 +876,7 @@
           <a:p>
             <a:fld id="{0065C04F-179E-4C52-8CB9-5605EB56CFE5}" type="datetimeFigureOut">
               <a:rPr lang="en-US" smtClean="0"/>
-              <a:t>3/24/2020</a:t>
+              <a:t>3/31/2020</a:t>
             </a:fld>
             <a:endParaRPr lang="en-US"/>
           </a:p>
@@ -1147,7 +1151,7 @@
           <a:p>
             <a:fld id="{0065C04F-179E-4C52-8CB9-5605EB56CFE5}" type="datetimeFigureOut">
               <a:rPr lang="en-US" smtClean="0"/>
-              <a:t>3/24/2020</a:t>
+              <a:t>3/31/2020</a:t>
             </a:fld>
             <a:endParaRPr lang="en-US"/>
           </a:p>
@@ -1412,7 +1416,7 @@
           <a:p>
             <a:fld id="{0065C04F-179E-4C52-8CB9-5605EB56CFE5}" type="datetimeFigureOut">
               <a:rPr lang="en-US" smtClean="0"/>
-              <a:t>3/24/2020</a:t>
+              <a:t>3/31/2020</a:t>
             </a:fld>
             <a:endParaRPr lang="en-US"/>
           </a:p>
@@ -1824,7 +1828,7 @@
           <a:p>
             <a:fld id="{0065C04F-179E-4C52-8CB9-5605EB56CFE5}" type="datetimeFigureOut">
               <a:rPr lang="en-US" smtClean="0"/>
-              <a:t>3/24/2020</a:t>
+              <a:t>3/31/2020</a:t>
             </a:fld>
             <a:endParaRPr lang="en-US"/>
           </a:p>
@@ -1965,7 +1969,7 @@
           <a:p>
             <a:fld id="{0065C04F-179E-4C52-8CB9-5605EB56CFE5}" type="datetimeFigureOut">
               <a:rPr lang="en-US" smtClean="0"/>
-              <a:t>3/24/2020</a:t>
+              <a:t>3/31/2020</a:t>
             </a:fld>
             <a:endParaRPr lang="en-US"/>
           </a:p>
@@ -2078,7 +2082,7 @@
           <a:p>
             <a:fld id="{0065C04F-179E-4C52-8CB9-5605EB56CFE5}" type="datetimeFigureOut">
               <a:rPr lang="en-US" smtClean="0"/>
-              <a:t>3/24/2020</a:t>
+              <a:t>3/31/2020</a:t>
             </a:fld>
             <a:endParaRPr lang="en-US"/>
           </a:p>
@@ -2389,7 +2393,7 @@
           <a:p>
             <a:fld id="{0065C04F-179E-4C52-8CB9-5605EB56CFE5}" type="datetimeFigureOut">
               <a:rPr lang="en-US" smtClean="0"/>
-              <a:t>3/24/2020</a:t>
+              <a:t>3/31/2020</a:t>
             </a:fld>
             <a:endParaRPr lang="en-US"/>
           </a:p>
@@ -2677,7 +2681,7 @@
           <a:p>
             <a:fld id="{0065C04F-179E-4C52-8CB9-5605EB56CFE5}" type="datetimeFigureOut">
               <a:rPr lang="en-US" smtClean="0"/>
-              <a:t>3/24/2020</a:t>
+              <a:t>3/31/2020</a:t>
             </a:fld>
             <a:endParaRPr lang="en-US"/>
           </a:p>
@@ -2918,7 +2922,7 @@
           <a:p>
             <a:fld id="{0065C04F-179E-4C52-8CB9-5605EB56CFE5}" type="datetimeFigureOut">
               <a:rPr lang="en-US" smtClean="0"/>
-              <a:t>3/24/2020</a:t>
+              <a:t>3/31/2020</a:t>
             </a:fld>
             <a:endParaRPr lang="en-US"/>
           </a:p>
@@ -3993,36 +3997,6 @@
     <p:extLst>
       <p:ext uri="{BB962C8B-B14F-4D97-AF65-F5344CB8AC3E}">
         <p14:creationId xmlns:p14="http://schemas.microsoft.com/office/powerpoint/2010/main" val="2032960890"/>
-      </p:ext>
-    </p:extLst>
-  </p:cSld>
-  <p:clrMapOvr>
-    <a:masterClrMapping/>
-  </p:clrMapOvr>
-</p:sld>
-</file>
-
-<file path=ppt/slides/slide15.xml><?xml version="1.0" encoding="utf-8"?>
-<p:sld xmlns:a="http://schemas.openxmlformats.org/drawingml/2006/main" xmlns:r="http://schemas.openxmlformats.org/officeDocument/2006/relationships" xmlns:p="http://schemas.openxmlformats.org/presentationml/2006/main">
-  <p:cSld>
-    <p:spTree>
-      <p:nvGrpSpPr>
-        <p:cNvPr id="1" name=""/>
-        <p:cNvGrpSpPr/>
-        <p:nvPr/>
-      </p:nvGrpSpPr>
-      <p:grpSpPr>
-        <a:xfrm>
-          <a:off x="0" y="0"/>
-          <a:ext cx="0" cy="0"/>
-          <a:chOff x="0" y="0"/>
-          <a:chExt cx="0" cy="0"/>
-        </a:xfrm>
-      </p:grpSpPr>
-    </p:spTree>
-    <p:extLst>
-      <p:ext uri="{BB962C8B-B14F-4D97-AF65-F5344CB8AC3E}">
-        <p14:creationId xmlns:p14="http://schemas.microsoft.com/office/powerpoint/2010/main" val="3586406572"/>
       </p:ext>
     </p:extLst>
   </p:cSld>

</xml_diff>